<commit_message>
Final Implementation of Wrapper 2
</commit_message>
<xml_diff>
--- a/Bi-Weekly Reports/Week 8.pptx
+++ b/Bi-Weekly Reports/Week 8.pptx
@@ -8,7 +8,8 @@
     <p:sldId id="256" r:id="rId2"/>
     <p:sldId id="257" r:id="rId3"/>
     <p:sldId id="258" r:id="rId4"/>
-    <p:sldId id="259" r:id="rId5"/>
+    <p:sldId id="260" r:id="rId5"/>
+    <p:sldId id="259" r:id="rId6"/>
   </p:sldIdLst>
   <p:sldSz cx="12192000" cy="6858000"/>
   <p:notesSz cx="6858000" cy="9144000"/>
@@ -107,6 +108,11 @@
       </a:defRPr>
     </a:lvl9pPr>
   </p:defaultTextStyle>
+  <p:extLst>
+    <p:ext uri="{EFAFB233-063F-42B5-8137-9DF3F51BA10A}">
+      <p15:sldGuideLst xmlns:p15="http://schemas.microsoft.com/office/powerpoint/2012/main"/>
+    </p:ext>
+  </p:extLst>
 </p:presentation>
 </file>
 
@@ -257,7 +263,7 @@
           <a:p>
             <a:fld id="{EFEF1BC4-F06A-4B69-A76D-84A76190C264}" type="datetimeFigureOut">
               <a:rPr lang="en-US" smtClean="0"/>
-              <a:t>3/8/2022</a:t>
+              <a:t>3/10/2022</a:t>
             </a:fld>
             <a:endParaRPr lang="en-US"/>
           </a:p>
@@ -455,7 +461,7 @@
           <a:p>
             <a:fld id="{EFEF1BC4-F06A-4B69-A76D-84A76190C264}" type="datetimeFigureOut">
               <a:rPr lang="en-US" smtClean="0"/>
-              <a:t>3/8/2022</a:t>
+              <a:t>3/10/2022</a:t>
             </a:fld>
             <a:endParaRPr lang="en-US"/>
           </a:p>
@@ -663,7 +669,7 @@
           <a:p>
             <a:fld id="{EFEF1BC4-F06A-4B69-A76D-84A76190C264}" type="datetimeFigureOut">
               <a:rPr lang="en-US" smtClean="0"/>
-              <a:t>3/8/2022</a:t>
+              <a:t>3/10/2022</a:t>
             </a:fld>
             <a:endParaRPr lang="en-US"/>
           </a:p>
@@ -861,7 +867,7 @@
           <a:p>
             <a:fld id="{EFEF1BC4-F06A-4B69-A76D-84A76190C264}" type="datetimeFigureOut">
               <a:rPr lang="en-US" smtClean="0"/>
-              <a:t>3/8/2022</a:t>
+              <a:t>3/10/2022</a:t>
             </a:fld>
             <a:endParaRPr lang="en-US"/>
           </a:p>
@@ -1136,7 +1142,7 @@
           <a:p>
             <a:fld id="{EFEF1BC4-F06A-4B69-A76D-84A76190C264}" type="datetimeFigureOut">
               <a:rPr lang="en-US" smtClean="0"/>
-              <a:t>3/8/2022</a:t>
+              <a:t>3/10/2022</a:t>
             </a:fld>
             <a:endParaRPr lang="en-US"/>
           </a:p>
@@ -1401,7 +1407,7 @@
           <a:p>
             <a:fld id="{EFEF1BC4-F06A-4B69-A76D-84A76190C264}" type="datetimeFigureOut">
               <a:rPr lang="en-US" smtClean="0"/>
-              <a:t>3/8/2022</a:t>
+              <a:t>3/10/2022</a:t>
             </a:fld>
             <a:endParaRPr lang="en-US"/>
           </a:p>
@@ -1813,7 +1819,7 @@
           <a:p>
             <a:fld id="{EFEF1BC4-F06A-4B69-A76D-84A76190C264}" type="datetimeFigureOut">
               <a:rPr lang="en-US" smtClean="0"/>
-              <a:t>3/8/2022</a:t>
+              <a:t>3/10/2022</a:t>
             </a:fld>
             <a:endParaRPr lang="en-US"/>
           </a:p>
@@ -1954,7 +1960,7 @@
           <a:p>
             <a:fld id="{EFEF1BC4-F06A-4B69-A76D-84A76190C264}" type="datetimeFigureOut">
               <a:rPr lang="en-US" smtClean="0"/>
-              <a:t>3/8/2022</a:t>
+              <a:t>3/10/2022</a:t>
             </a:fld>
             <a:endParaRPr lang="en-US"/>
           </a:p>
@@ -2067,7 +2073,7 @@
           <a:p>
             <a:fld id="{EFEF1BC4-F06A-4B69-A76D-84A76190C264}" type="datetimeFigureOut">
               <a:rPr lang="en-US" smtClean="0"/>
-              <a:t>3/8/2022</a:t>
+              <a:t>3/10/2022</a:t>
             </a:fld>
             <a:endParaRPr lang="en-US"/>
           </a:p>
@@ -2378,7 +2384,7 @@
           <a:p>
             <a:fld id="{EFEF1BC4-F06A-4B69-A76D-84A76190C264}" type="datetimeFigureOut">
               <a:rPr lang="en-US" smtClean="0"/>
-              <a:t>3/8/2022</a:t>
+              <a:t>3/10/2022</a:t>
             </a:fld>
             <a:endParaRPr lang="en-US"/>
           </a:p>
@@ -2666,7 +2672,7 @@
           <a:p>
             <a:fld id="{EFEF1BC4-F06A-4B69-A76D-84A76190C264}" type="datetimeFigureOut">
               <a:rPr lang="en-US" smtClean="0"/>
-              <a:t>3/8/2022</a:t>
+              <a:t>3/10/2022</a:t>
             </a:fld>
             <a:endParaRPr lang="en-US"/>
           </a:p>
@@ -2907,7 +2913,7 @@
           <a:p>
             <a:fld id="{EFEF1BC4-F06A-4B69-A76D-84A76190C264}" type="datetimeFigureOut">
               <a:rPr lang="en-US" smtClean="0"/>
-              <a:t>3/8/2022</a:t>
+              <a:t>3/10/2022</a:t>
             </a:fld>
             <a:endParaRPr lang="en-US"/>
           </a:p>
@@ -4276,6 +4282,114 @@
           <p:cNvPr id="2" name="Title 1">
             <a:extLst>
               <a:ext uri="{FF2B5EF4-FFF2-40B4-BE49-F238E27FC236}">
+                <a16:creationId xmlns:a16="http://schemas.microsoft.com/office/drawing/2014/main" id="{E2389825-640A-47AA-9B1F-EA58E4700CF2}"/>
+              </a:ext>
+            </a:extLst>
+          </p:cNvPr>
+          <p:cNvSpPr>
+            <a:spLocks noGrp="1"/>
+          </p:cNvSpPr>
+          <p:nvPr>
+            <p:ph type="title"/>
+          </p:nvPr>
+        </p:nvSpPr>
+        <p:spPr/>
+        <p:txBody>
+          <a:bodyPr>
+            <a:normAutofit/>
+          </a:bodyPr>
+          <a:lstStyle/>
+          <a:p>
+            <a:r>
+              <a:rPr lang="en-US" dirty="0"/>
+              <a:t>Improve on the Wrapper</a:t>
+            </a:r>
+          </a:p>
+        </p:txBody>
+      </p:sp>
+      <p:sp>
+        <p:nvSpPr>
+          <p:cNvPr id="3" name="Content Placeholder 2">
+            <a:extLst>
+              <a:ext uri="{FF2B5EF4-FFF2-40B4-BE49-F238E27FC236}">
+                <a16:creationId xmlns:a16="http://schemas.microsoft.com/office/drawing/2014/main" id="{79262E78-93D9-4641-B686-7AA8F431439D}"/>
+              </a:ext>
+            </a:extLst>
+          </p:cNvPr>
+          <p:cNvSpPr>
+            <a:spLocks noGrp="1"/>
+          </p:cNvSpPr>
+          <p:nvPr>
+            <p:ph sz="half" idx="1"/>
+          </p:nvPr>
+        </p:nvSpPr>
+        <p:spPr>
+          <a:xfrm>
+            <a:off x="838199" y="1825625"/>
+            <a:ext cx="10176933" cy="4351338"/>
+          </a:xfrm>
+        </p:spPr>
+        <p:txBody>
+          <a:bodyPr/>
+          <a:lstStyle/>
+          <a:p>
+            <a:r>
+              <a:rPr lang="en-US" dirty="0"/>
+              <a:t>Developing a custom data loader to train the model to work by separating out one voice at a time</a:t>
+            </a:r>
+          </a:p>
+          <a:p>
+            <a:r>
+              <a:rPr lang="en-US" dirty="0"/>
+              <a:t>The trainer will make it so each model made will be trained to separate one known person which will be trained with an audio profile</a:t>
+            </a:r>
+          </a:p>
+          <a:p>
+            <a:r>
+              <a:rPr lang="en-US" dirty="0"/>
+              <a:t>We are currently facing resource issues (hardware limitations) where we can’t even open the model to begin training</a:t>
+            </a:r>
+          </a:p>
+          <a:p>
+            <a:endParaRPr lang="en-US" dirty="0"/>
+          </a:p>
+        </p:txBody>
+      </p:sp>
+    </p:spTree>
+    <p:extLst>
+      <p:ext uri="{BB962C8B-B14F-4D97-AF65-F5344CB8AC3E}">
+        <p14:creationId xmlns:p14="http://schemas.microsoft.com/office/powerpoint/2010/main" val="3049196440"/>
+      </p:ext>
+    </p:extLst>
+  </p:cSld>
+  <p:clrMapOvr>
+    <a:masterClrMapping/>
+  </p:clrMapOvr>
+</p:sld>
+</file>
+
+<file path=ppt/slides/slide5.xml><?xml version="1.0" encoding="utf-8"?>
+<p:sld xmlns:a="http://schemas.openxmlformats.org/drawingml/2006/main" xmlns:r="http://schemas.openxmlformats.org/officeDocument/2006/relationships" xmlns:p="http://schemas.openxmlformats.org/presentationml/2006/main">
+  <p:cSld>
+    <p:spTree>
+      <p:nvGrpSpPr>
+        <p:cNvPr id="1" name=""/>
+        <p:cNvGrpSpPr/>
+        <p:nvPr/>
+      </p:nvGrpSpPr>
+      <p:grpSpPr>
+        <a:xfrm>
+          <a:off x="0" y="0"/>
+          <a:ext cx="0" cy="0"/>
+          <a:chOff x="0" y="0"/>
+          <a:chExt cx="0" cy="0"/>
+        </a:xfrm>
+      </p:grpSpPr>
+      <p:sp>
+        <p:nvSpPr>
+          <p:cNvPr id="2" name="Title 1">
+            <a:extLst>
+              <a:ext uri="{FF2B5EF4-FFF2-40B4-BE49-F238E27FC236}">
                 <a16:creationId xmlns:a16="http://schemas.microsoft.com/office/drawing/2014/main" id="{9E350DD6-089B-4585-B952-48A7325CCD4D}"/>
               </a:ext>
             </a:extLst>
@@ -4315,10 +4429,15 @@
             <p:ph sz="half" idx="1"/>
           </p:nvPr>
         </p:nvSpPr>
-        <p:spPr/>
+        <p:spPr>
+          <a:xfrm>
+            <a:off x="838199" y="1825625"/>
+            <a:ext cx="9364133" cy="4351338"/>
+          </a:xfrm>
+        </p:spPr>
         <p:txBody>
           <a:bodyPr>
-            <a:normAutofit lnSpcReduction="10000"/>
+            <a:normAutofit/>
           </a:bodyPr>
           <a:lstStyle/>
           <a:p>
@@ -4328,6 +4447,20 @@
             </a:r>
           </a:p>
           <a:p>
+            <a:pPr lvl="1"/>
+            <a:r>
+              <a:rPr lang="en-US" dirty="0"/>
+              <a:t>Still unable to get python 3.9 installed on the dev board</a:t>
+            </a:r>
+          </a:p>
+          <a:p>
+            <a:pPr lvl="1"/>
+            <a:r>
+              <a:rPr lang="en-US" dirty="0"/>
+              <a:t>This means we can’t try our wrapper on it</a:t>
+            </a:r>
+          </a:p>
+          <a:p>
             <a:r>
               <a:rPr lang="en-US" dirty="0"/>
               <a:t>Ran a python script that recorded audio with the on-board microphone</a:t>
@@ -4344,33 +4477,6 @@
               <a:rPr lang="en-US" dirty="0"/>
               <a:t>Working on getting the wav file out of the dev board environment</a:t>
             </a:r>
-          </a:p>
-        </p:txBody>
-      </p:sp>
-      <p:sp>
-        <p:nvSpPr>
-          <p:cNvPr id="4" name="Content Placeholder 3">
-            <a:extLst>
-              <a:ext uri="{FF2B5EF4-FFF2-40B4-BE49-F238E27FC236}">
-                <a16:creationId xmlns:a16="http://schemas.microsoft.com/office/drawing/2014/main" id="{28BCC6AA-F6AB-42EC-89E8-28D18BA1D0EB}"/>
-              </a:ext>
-            </a:extLst>
-          </p:cNvPr>
-          <p:cNvSpPr>
-            <a:spLocks noGrp="1"/>
-          </p:cNvSpPr>
-          <p:nvPr>
-            <p:ph sz="half" idx="2"/>
-          </p:nvPr>
-        </p:nvSpPr>
-        <p:spPr/>
-        <p:txBody>
-          <a:bodyPr>
-            <a:normAutofit lnSpcReduction="10000"/>
-          </a:bodyPr>
-          <a:lstStyle/>
-          <a:p>
-            <a:endParaRPr lang="en-US"/>
           </a:p>
         </p:txBody>
       </p:sp>

</xml_diff>